<commit_message>
New Version of Presentation of Project
</commit_message>
<xml_diff>
--- a/Build1.pptx
+++ b/Build1.pptx
@@ -1190,7 +1190,7 @@
           <a:p>
             <a:fld id="{FF11F0EC-4F60-4544-9956-271209A740FE}" type="datetimeFigureOut">
               <a:rPr lang="en-US" smtClean="0"/>
-              <a:t>10/19/2017</a:t>
+              <a:t>10/20/2017</a:t>
             </a:fld>
             <a:endParaRPr lang="en-US"/>
           </a:p>
@@ -1441,7 +1441,7 @@
           <a:p>
             <a:fld id="{FF11F0EC-4F60-4544-9956-271209A740FE}" type="datetimeFigureOut">
               <a:rPr lang="en-US" smtClean="0"/>
-              <a:t>10/19/2017</a:t>
+              <a:t>10/20/2017</a:t>
             </a:fld>
             <a:endParaRPr lang="en-US"/>
           </a:p>
@@ -1692,7 +1692,7 @@
           <a:p>
             <a:fld id="{FF11F0EC-4F60-4544-9956-271209A740FE}" type="datetimeFigureOut">
               <a:rPr lang="en-US" smtClean="0"/>
-              <a:t>10/19/2017</a:t>
+              <a:t>10/20/2017</a:t>
             </a:fld>
             <a:endParaRPr lang="en-US"/>
           </a:p>
@@ -2264,7 +2264,7 @@
           <a:p>
             <a:fld id="{FF11F0EC-4F60-4544-9956-271209A740FE}" type="datetimeFigureOut">
               <a:rPr lang="en-US" smtClean="0"/>
-              <a:t>10/19/2017</a:t>
+              <a:t>10/20/2017</a:t>
             </a:fld>
             <a:endParaRPr lang="en-US"/>
           </a:p>
@@ -2515,7 +2515,7 @@
           <a:p>
             <a:fld id="{FF11F0EC-4F60-4544-9956-271209A740FE}" type="datetimeFigureOut">
               <a:rPr lang="en-US" smtClean="0"/>
-              <a:t>10/19/2017</a:t>
+              <a:t>10/20/2017</a:t>
             </a:fld>
             <a:endParaRPr lang="en-US"/>
           </a:p>
@@ -3087,7 +3087,7 @@
           <a:p>
             <a:fld id="{FF11F0EC-4F60-4544-9956-271209A740FE}" type="datetimeFigureOut">
               <a:rPr lang="en-US" smtClean="0"/>
-              <a:t>10/19/2017</a:t>
+              <a:t>10/20/2017</a:t>
             </a:fld>
             <a:endParaRPr lang="en-US"/>
           </a:p>
@@ -3317,7 +3317,7 @@
           <a:p>
             <a:fld id="{FF11F0EC-4F60-4544-9956-271209A740FE}" type="datetimeFigureOut">
               <a:rPr lang="en-US" smtClean="0"/>
-              <a:t>10/19/2017</a:t>
+              <a:t>10/20/2017</a:t>
             </a:fld>
             <a:endParaRPr lang="en-US"/>
           </a:p>
@@ -3497,7 +3497,7 @@
           <a:p>
             <a:fld id="{FF11F0EC-4F60-4544-9956-271209A740FE}" type="datetimeFigureOut">
               <a:rPr lang="en-US" smtClean="0"/>
-              <a:t>10/19/2017</a:t>
+              <a:t>10/20/2017</a:t>
             </a:fld>
             <a:endParaRPr lang="en-US"/>
           </a:p>
@@ -3673,7 +3673,7 @@
           <a:p>
             <a:fld id="{FF11F0EC-4F60-4544-9956-271209A740FE}" type="datetimeFigureOut">
               <a:rPr lang="en-US" smtClean="0"/>
-              <a:t>10/19/2017</a:t>
+              <a:t>10/20/2017</a:t>
             </a:fld>
             <a:endParaRPr lang="en-US"/>
           </a:p>
@@ -3920,7 +3920,7 @@
           <a:p>
             <a:fld id="{FF11F0EC-4F60-4544-9956-271209A740FE}" type="datetimeFigureOut">
               <a:rPr lang="en-US" smtClean="0"/>
-              <a:t>10/19/2017</a:t>
+              <a:t>10/20/2017</a:t>
             </a:fld>
             <a:endParaRPr lang="en-US"/>
           </a:p>
@@ -4152,7 +4152,7 @@
           <a:p>
             <a:fld id="{FF11F0EC-4F60-4544-9956-271209A740FE}" type="datetimeFigureOut">
               <a:rPr lang="en-US" smtClean="0"/>
-              <a:t>10/19/2017</a:t>
+              <a:t>10/20/2017</a:t>
             </a:fld>
             <a:endParaRPr lang="en-US"/>
           </a:p>
@@ -4526,7 +4526,7 @@
           <a:p>
             <a:fld id="{FF11F0EC-4F60-4544-9956-271209A740FE}" type="datetimeFigureOut">
               <a:rPr lang="en-US" smtClean="0"/>
-              <a:t>10/19/2017</a:t>
+              <a:t>10/20/2017</a:t>
             </a:fld>
             <a:endParaRPr lang="en-US"/>
           </a:p>
@@ -4649,7 +4649,7 @@
           <a:p>
             <a:fld id="{FF11F0EC-4F60-4544-9956-271209A740FE}" type="datetimeFigureOut">
               <a:rPr lang="en-US" smtClean="0"/>
-              <a:t>10/19/2017</a:t>
+              <a:t>10/20/2017</a:t>
             </a:fld>
             <a:endParaRPr lang="en-US"/>
           </a:p>
@@ -4744,7 +4744,7 @@
           <a:p>
             <a:fld id="{FF11F0EC-4F60-4544-9956-271209A740FE}" type="datetimeFigureOut">
               <a:rPr lang="en-US" smtClean="0"/>
-              <a:t>10/19/2017</a:t>
+              <a:t>10/20/2017</a:t>
             </a:fld>
             <a:endParaRPr lang="en-US"/>
           </a:p>
@@ -4999,7 +4999,7 @@
           <a:p>
             <a:fld id="{FF11F0EC-4F60-4544-9956-271209A740FE}" type="datetimeFigureOut">
               <a:rPr lang="en-US" smtClean="0"/>
-              <a:t>10/19/2017</a:t>
+              <a:t>10/20/2017</a:t>
             </a:fld>
             <a:endParaRPr lang="en-US"/>
           </a:p>
@@ -5262,7 +5262,7 @@
           <a:p>
             <a:fld id="{FF11F0EC-4F60-4544-9956-271209A740FE}" type="datetimeFigureOut">
               <a:rPr lang="en-US" smtClean="0"/>
-              <a:t>10/19/2017</a:t>
+              <a:t>10/20/2017</a:t>
             </a:fld>
             <a:endParaRPr lang="en-US"/>
           </a:p>
@@ -6346,7 +6346,7 @@
           <a:p>
             <a:fld id="{FF11F0EC-4F60-4544-9956-271209A740FE}" type="datetimeFigureOut">
               <a:rPr lang="en-US" smtClean="0"/>
-              <a:t>10/19/2017</a:t>
+              <a:t>10/20/2017</a:t>
             </a:fld>
             <a:endParaRPr lang="en-US"/>
           </a:p>
@@ -8431,15 +8431,7 @@
           <a:p>
             <a:r>
               <a:rPr lang="en-US" dirty="0" smtClean="0"/>
-              <a:t>Design </a:t>
-            </a:r>
-            <a:r>
-              <a:rPr lang="en-US" dirty="0" smtClean="0"/>
-              <a:t>Principles</a:t>
-            </a:r>
-            <a:r>
-              <a:rPr lang="en-US" dirty="0" smtClean="0"/>
-              <a:t>.</a:t>
+              <a:t>Design Principles.</a:t>
             </a:r>
           </a:p>
           <a:p>
@@ -8866,31 +8858,26 @@
       </p:sp>
       <p:pic>
         <p:nvPicPr>
-          <p:cNvPr id="6" name="Content Placeholder 5"/>
+          <p:cNvPr id="3" name="Picture 2"/>
           <p:cNvPicPr>
-            <a:picLocks noGrp="1" noChangeAspect="1"/>
+            <a:picLocks noChangeAspect="1"/>
           </p:cNvPicPr>
-          <p:nvPr>
-            <p:ph idx="1"/>
-          </p:nvPr>
+          <p:nvPr/>
         </p:nvPicPr>
         <p:blipFill>
-          <a:blip r:embed="rId2">
-            <a:extLst>
-              <a:ext uri="{28A0092B-C50C-407E-A947-70E740481C1C}">
-                <a14:useLocalDpi xmlns:a14="http://schemas.microsoft.com/office/drawing/2010/main" val="0"/>
-              </a:ext>
-            </a:extLst>
-          </a:blip>
+          <a:blip r:embed="rId2"/>
           <a:stretch>
             <a:fillRect/>
           </a:stretch>
         </p:blipFill>
         <p:spPr>
           <a:xfrm>
-            <a:off x="1403076" y="1661374"/>
-            <a:ext cx="7147776" cy="4417453"/>
+            <a:off x="1133340" y="1270000"/>
+            <a:ext cx="8143078" cy="4789079"/>
           </a:xfrm>
+          <a:prstGeom prst="rect">
+            <a:avLst/>
+          </a:prstGeom>
         </p:spPr>
       </p:pic>
     </p:spTree>
@@ -9122,7 +9109,6 @@
               <a:rPr lang="en-US" dirty="0" smtClean="0"/>
               <a:t> 4 is used.</a:t>
             </a:r>
-            <a:endParaRPr lang="en-US" dirty="0" smtClean="0"/>
           </a:p>
           <a:p>
             <a:r>
@@ -9131,11 +9117,7 @@
             </a:r>
             <a:r>
               <a:rPr lang="en-US" dirty="0" smtClean="0"/>
-              <a:t> </a:t>
-            </a:r>
-            <a:r>
-              <a:rPr lang="en-US" dirty="0" smtClean="0"/>
-              <a:t>4 test is chosen as the latest and popular unit testing.</a:t>
+              <a:t> 4 test is chosen as the latest and popular unit testing.</a:t>
             </a:r>
           </a:p>
           <a:p>
@@ -9145,11 +9127,7 @@
             </a:r>
             <a:r>
               <a:rPr lang="en-US" dirty="0" smtClean="0"/>
-              <a:t> Tests are written and executed</a:t>
-            </a:r>
-            <a:r>
-              <a:rPr lang="en-US" dirty="0" smtClean="0"/>
-              <a:t>.</a:t>
+              <a:t> Tests are written and executed.</a:t>
             </a:r>
           </a:p>
           <a:p>

</xml_diff>